<commit_message>
Correção de coloração e tamanho de arquivos
</commit_message>
<xml_diff>
--- a/testes/Apresentação1.pptx
+++ b/testes/Apresentação1.pptx
@@ -309,7 +309,7 @@
           <a:p>
             <a:fld id="{FD5B367D-29B7-4080-8A59-C1BB6A4D0CDA}" type="datetimeFigureOut">
               <a:rPr lang="en-US" smtClean="0"/>
-              <a:t>9/24/2017</a:t>
+              <a:t>10/1/2017</a:t>
             </a:fld>
             <a:endParaRPr lang="en-US"/>
           </a:p>
@@ -351,7 +351,7 @@
           <a:p>
             <a:fld id="{AF1DD908-D639-4A48-9AD0-6109B03F88D1}" type="slidenum">
               <a:rPr lang="en-US" smtClean="0"/>
-              <a:t>‹nº›</a:t>
+              <a:t>‹#›</a:t>
             </a:fld>
             <a:endParaRPr lang="en-US"/>
           </a:p>
@@ -477,7 +477,7 @@
           <a:p>
             <a:fld id="{FD5B367D-29B7-4080-8A59-C1BB6A4D0CDA}" type="datetimeFigureOut">
               <a:rPr lang="en-US" smtClean="0"/>
-              <a:t>9/24/2017</a:t>
+              <a:t>10/1/2017</a:t>
             </a:fld>
             <a:endParaRPr lang="en-US"/>
           </a:p>
@@ -519,7 +519,7 @@
           <a:p>
             <a:fld id="{AF1DD908-D639-4A48-9AD0-6109B03F88D1}" type="slidenum">
               <a:rPr lang="en-US" smtClean="0"/>
-              <a:t>‹nº›</a:t>
+              <a:t>‹#›</a:t>
             </a:fld>
             <a:endParaRPr lang="en-US"/>
           </a:p>
@@ -655,7 +655,7 @@
           <a:p>
             <a:fld id="{FD5B367D-29B7-4080-8A59-C1BB6A4D0CDA}" type="datetimeFigureOut">
               <a:rPr lang="en-US" smtClean="0"/>
-              <a:t>9/24/2017</a:t>
+              <a:t>10/1/2017</a:t>
             </a:fld>
             <a:endParaRPr lang="en-US"/>
           </a:p>
@@ -697,7 +697,7 @@
           <a:p>
             <a:fld id="{AF1DD908-D639-4A48-9AD0-6109B03F88D1}" type="slidenum">
               <a:rPr lang="en-US" smtClean="0"/>
-              <a:t>‹nº›</a:t>
+              <a:t>‹#›</a:t>
             </a:fld>
             <a:endParaRPr lang="en-US"/>
           </a:p>
@@ -823,7 +823,7 @@
           <a:p>
             <a:fld id="{FD5B367D-29B7-4080-8A59-C1BB6A4D0CDA}" type="datetimeFigureOut">
               <a:rPr lang="en-US" smtClean="0"/>
-              <a:t>9/24/2017</a:t>
+              <a:t>10/1/2017</a:t>
             </a:fld>
             <a:endParaRPr lang="en-US"/>
           </a:p>
@@ -865,7 +865,7 @@
           <a:p>
             <a:fld id="{AF1DD908-D639-4A48-9AD0-6109B03F88D1}" type="slidenum">
               <a:rPr lang="en-US" smtClean="0"/>
-              <a:t>‹nº›</a:t>
+              <a:t>‹#›</a:t>
             </a:fld>
             <a:endParaRPr lang="en-US"/>
           </a:p>
@@ -1068,7 +1068,7 @@
           <a:p>
             <a:fld id="{FD5B367D-29B7-4080-8A59-C1BB6A4D0CDA}" type="datetimeFigureOut">
               <a:rPr lang="en-US" smtClean="0"/>
-              <a:t>9/24/2017</a:t>
+              <a:t>10/1/2017</a:t>
             </a:fld>
             <a:endParaRPr lang="en-US"/>
           </a:p>
@@ -1110,7 +1110,7 @@
           <a:p>
             <a:fld id="{AF1DD908-D639-4A48-9AD0-6109B03F88D1}" type="slidenum">
               <a:rPr lang="en-US" smtClean="0"/>
-              <a:t>‹nº›</a:t>
+              <a:t>‹#›</a:t>
             </a:fld>
             <a:endParaRPr lang="en-US"/>
           </a:p>
@@ -1353,7 +1353,7 @@
           <a:p>
             <a:fld id="{FD5B367D-29B7-4080-8A59-C1BB6A4D0CDA}" type="datetimeFigureOut">
               <a:rPr lang="en-US" smtClean="0"/>
-              <a:t>9/24/2017</a:t>
+              <a:t>10/1/2017</a:t>
             </a:fld>
             <a:endParaRPr lang="en-US"/>
           </a:p>
@@ -1395,7 +1395,7 @@
           <a:p>
             <a:fld id="{AF1DD908-D639-4A48-9AD0-6109B03F88D1}" type="slidenum">
               <a:rPr lang="en-US" smtClean="0"/>
-              <a:t>‹nº›</a:t>
+              <a:t>‹#›</a:t>
             </a:fld>
             <a:endParaRPr lang="en-US"/>
           </a:p>
@@ -1772,7 +1772,7 @@
           <a:p>
             <a:fld id="{FD5B367D-29B7-4080-8A59-C1BB6A4D0CDA}" type="datetimeFigureOut">
               <a:rPr lang="en-US" smtClean="0"/>
-              <a:t>9/24/2017</a:t>
+              <a:t>10/1/2017</a:t>
             </a:fld>
             <a:endParaRPr lang="en-US"/>
           </a:p>
@@ -1814,7 +1814,7 @@
           <a:p>
             <a:fld id="{AF1DD908-D639-4A48-9AD0-6109B03F88D1}" type="slidenum">
               <a:rPr lang="en-US" smtClean="0"/>
-              <a:t>‹nº›</a:t>
+              <a:t>‹#›</a:t>
             </a:fld>
             <a:endParaRPr lang="en-US"/>
           </a:p>
@@ -1889,7 +1889,7 @@
           <a:p>
             <a:fld id="{FD5B367D-29B7-4080-8A59-C1BB6A4D0CDA}" type="datetimeFigureOut">
               <a:rPr lang="en-US" smtClean="0"/>
-              <a:t>9/24/2017</a:t>
+              <a:t>10/1/2017</a:t>
             </a:fld>
             <a:endParaRPr lang="en-US"/>
           </a:p>
@@ -1931,7 +1931,7 @@
           <a:p>
             <a:fld id="{AF1DD908-D639-4A48-9AD0-6109B03F88D1}" type="slidenum">
               <a:rPr lang="en-US" smtClean="0"/>
-              <a:t>‹nº›</a:t>
+              <a:t>‹#›</a:t>
             </a:fld>
             <a:endParaRPr lang="en-US"/>
           </a:p>
@@ -1984,7 +1984,7 @@
           <a:p>
             <a:fld id="{FD5B367D-29B7-4080-8A59-C1BB6A4D0CDA}" type="datetimeFigureOut">
               <a:rPr lang="en-US" smtClean="0"/>
-              <a:t>9/24/2017</a:t>
+              <a:t>10/1/2017</a:t>
             </a:fld>
             <a:endParaRPr lang="en-US"/>
           </a:p>
@@ -2026,7 +2026,7 @@
           <a:p>
             <a:fld id="{AF1DD908-D639-4A48-9AD0-6109B03F88D1}" type="slidenum">
               <a:rPr lang="en-US" smtClean="0"/>
-              <a:t>‹nº›</a:t>
+              <a:t>‹#›</a:t>
             </a:fld>
             <a:endParaRPr lang="en-US"/>
           </a:p>
@@ -2259,7 +2259,7 @@
           <a:p>
             <a:fld id="{FD5B367D-29B7-4080-8A59-C1BB6A4D0CDA}" type="datetimeFigureOut">
               <a:rPr lang="en-US" smtClean="0"/>
-              <a:t>9/24/2017</a:t>
+              <a:t>10/1/2017</a:t>
             </a:fld>
             <a:endParaRPr lang="en-US"/>
           </a:p>
@@ -2301,7 +2301,7 @@
           <a:p>
             <a:fld id="{AF1DD908-D639-4A48-9AD0-6109B03F88D1}" type="slidenum">
               <a:rPr lang="en-US" smtClean="0"/>
-              <a:t>‹nº›</a:t>
+              <a:t>‹#›</a:t>
             </a:fld>
             <a:endParaRPr lang="en-US"/>
           </a:p>
@@ -2511,7 +2511,7 @@
           <a:p>
             <a:fld id="{FD5B367D-29B7-4080-8A59-C1BB6A4D0CDA}" type="datetimeFigureOut">
               <a:rPr lang="en-US" smtClean="0"/>
-              <a:t>9/24/2017</a:t>
+              <a:t>10/1/2017</a:t>
             </a:fld>
             <a:endParaRPr lang="en-US"/>
           </a:p>
@@ -2553,7 +2553,7 @@
           <a:p>
             <a:fld id="{AF1DD908-D639-4A48-9AD0-6109B03F88D1}" type="slidenum">
               <a:rPr lang="en-US" smtClean="0"/>
-              <a:t>‹nº›</a:t>
+              <a:t>‹#›</a:t>
             </a:fld>
             <a:endParaRPr lang="en-US"/>
           </a:p>
@@ -2724,7 +2724,7 @@
           <a:p>
             <a:fld id="{FD5B367D-29B7-4080-8A59-C1BB6A4D0CDA}" type="datetimeFigureOut">
               <a:rPr lang="en-US" smtClean="0"/>
-              <a:t>9/24/2017</a:t>
+              <a:t>10/1/2017</a:t>
             </a:fld>
             <a:endParaRPr lang="en-US"/>
           </a:p>
@@ -2802,7 +2802,7 @@
           <a:p>
             <a:fld id="{AF1DD908-D639-4A48-9AD0-6109B03F88D1}" type="slidenum">
               <a:rPr lang="en-US" smtClean="0"/>
-              <a:t>‹nº›</a:t>
+              <a:t>‹#›</a:t>
             </a:fld>
             <a:endParaRPr lang="en-US"/>
           </a:p>
@@ -3121,8 +3121,8 @@
         </p:blipFill>
         <p:spPr>
           <a:xfrm>
-            <a:off x="0" y="1620384"/>
-            <a:ext cx="7020000" cy="5265000"/>
+            <a:off x="-1" y="1772816"/>
+            <a:ext cx="6816757" cy="5112568"/>
           </a:xfrm>
           <a:prstGeom prst="rect">
             <a:avLst/>
@@ -3131,295 +3131,14 @@
       </p:pic>
       <p:sp>
         <p:nvSpPr>
-          <p:cNvPr id="6" name="Retângulo com Canto Diagonal Aparado 5"/>
-          <p:cNvSpPr/>
-          <p:nvPr/>
-        </p:nvSpPr>
-        <p:spPr>
-          <a:xfrm>
-            <a:off x="4355976" y="5049208"/>
-            <a:ext cx="1764000" cy="504000"/>
-          </a:xfrm>
-          <a:prstGeom prst="snip2DiagRect">
-            <a:avLst>
-              <a:gd name="adj1" fmla="val 30865"/>
-              <a:gd name="adj2" fmla="val 16667"/>
-            </a:avLst>
-          </a:prstGeom>
-          <a:blipFill>
-            <a:blip r:embed="rId3">
-              <a:grayscl/>
-            </a:blip>
-            <a:tile tx="0" ty="0" sx="100000" sy="100000" flip="none" algn="tl"/>
-          </a:blipFill>
-          <a:ln>
-            <a:noFill/>
-          </a:ln>
-          <a:scene3d>
-            <a:camera prst="orthographicFront"/>
-            <a:lightRig rig="threePt" dir="t"/>
-          </a:scene3d>
-          <a:sp3d>
-            <a:bevelT prst="angle"/>
-          </a:sp3d>
-        </p:spPr>
-        <p:style>
-          <a:lnRef idx="2">
-            <a:schemeClr val="accent1">
-              <a:shade val="50000"/>
-            </a:schemeClr>
-          </a:lnRef>
-          <a:fillRef idx="1">
-            <a:schemeClr val="accent1"/>
-          </a:fillRef>
-          <a:effectRef idx="0">
-            <a:schemeClr val="accent1"/>
-          </a:effectRef>
-          <a:fontRef idx="minor">
-            <a:schemeClr val="lt1"/>
-          </a:fontRef>
-        </p:style>
-        <p:txBody>
-          <a:bodyPr rtlCol="0" anchor="ctr"/>
-          <a:lstStyle/>
-          <a:p>
-            <a:pPr algn="ctr"/>
-            <a:r>
-              <a:rPr lang="pt-BR" sz="2000" b="1" spc="50" dirty="0">
-                <a:ln w="13500">
-                  <a:solidFill>
-                    <a:schemeClr val="accent1">
-                      <a:shade val="2500"/>
-                      <a:alpha val="6500"/>
-                    </a:schemeClr>
-                  </a:solidFill>
-                  <a:prstDash val="solid"/>
-                </a:ln>
-                <a:solidFill>
-                  <a:schemeClr val="bg1">
-                    <a:lumMod val="50000"/>
-                    <a:alpha val="60000"/>
-                  </a:schemeClr>
-                </a:solidFill>
-                <a:effectLst>
-                  <a:innerShdw blurRad="50900" dist="38500" dir="13500000">
-                    <a:srgbClr val="000000">
-                      <a:alpha val="60000"/>
-                    </a:srgbClr>
-                  </a:innerShdw>
-                </a:effectLst>
-                <a:latin typeface="Showcard Gothic" panose="04020904020102020604" pitchFamily="82" charset="0"/>
-              </a:rPr>
-              <a:t>help</a:t>
-            </a:r>
-          </a:p>
-        </p:txBody>
-      </p:sp>
-      <p:sp>
-        <p:nvSpPr>
-          <p:cNvPr id="7" name="Retângulo com Canto Diagonal Aparado 6"/>
-          <p:cNvSpPr/>
-          <p:nvPr/>
-        </p:nvSpPr>
-        <p:spPr>
-          <a:xfrm>
-            <a:off x="4860032" y="4293096"/>
-            <a:ext cx="1764000" cy="504000"/>
-          </a:xfrm>
-          <a:prstGeom prst="snip2DiagRect">
-            <a:avLst>
-              <a:gd name="adj1" fmla="val 30893"/>
-              <a:gd name="adj2" fmla="val 18136"/>
-            </a:avLst>
-          </a:prstGeom>
-          <a:blipFill>
-            <a:blip r:embed="rId4">
-              <a:grayscl/>
-              <a:extLst>
-                <a:ext uri="{BEBA8EAE-BF5A-486C-A8C5-ECC9F3942E4B}">
-                  <a14:imgProps xmlns:a14="http://schemas.microsoft.com/office/drawing/2010/main">
-                    <a14:imgLayer r:embed="rId5">
-                      <a14:imgEffect>
-                        <a14:sharpenSoften amount="100000"/>
-                      </a14:imgEffect>
-                      <a14:imgEffect>
-                        <a14:colorTemperature colorTemp="11500"/>
-                      </a14:imgEffect>
-                      <a14:imgEffect>
-                        <a14:saturation sat="400000"/>
-                      </a14:imgEffect>
-                    </a14:imgLayer>
-                  </a14:imgProps>
-                </a:ext>
-              </a:extLst>
-            </a:blip>
-            <a:tile tx="0" ty="0" sx="100000" sy="100000" flip="none" algn="tl"/>
-          </a:blipFill>
-          <a:ln>
-            <a:noFill/>
-          </a:ln>
-          <a:scene3d>
-            <a:camera prst="orthographicFront"/>
-            <a:lightRig rig="threePt" dir="t"/>
-          </a:scene3d>
-          <a:sp3d extrusionH="76200">
-            <a:bevelT prst="angle"/>
-            <a:extrusionClr>
-              <a:srgbClr val="FF0000"/>
-            </a:extrusionClr>
-          </a:sp3d>
-        </p:spPr>
-        <p:style>
-          <a:lnRef idx="2">
-            <a:schemeClr val="accent1">
-              <a:shade val="50000"/>
-            </a:schemeClr>
-          </a:lnRef>
-          <a:fillRef idx="1">
-            <a:schemeClr val="accent1"/>
-          </a:fillRef>
-          <a:effectRef idx="0">
-            <a:schemeClr val="accent1"/>
-          </a:effectRef>
-          <a:fontRef idx="minor">
-            <a:schemeClr val="lt1"/>
-          </a:fontRef>
-        </p:style>
-        <p:txBody>
-          <a:bodyPr rtlCol="0" anchor="ctr"/>
-          <a:lstStyle/>
-          <a:p>
-            <a:pPr algn="ctr"/>
-            <a:r>
-              <a:rPr lang="pt-BR" sz="2000" b="1" spc="50" dirty="0">
-                <a:ln w="13500">
-                  <a:solidFill>
-                    <a:schemeClr val="accent1">
-                      <a:shade val="2500"/>
-                      <a:alpha val="0"/>
-                    </a:schemeClr>
-                  </a:solidFill>
-                  <a:prstDash val="solid"/>
-                </a:ln>
-                <a:solidFill>
-                  <a:schemeClr val="bg1">
-                    <a:lumMod val="50000"/>
-                    <a:alpha val="60000"/>
-                  </a:schemeClr>
-                </a:solidFill>
-                <a:effectLst>
-                  <a:innerShdw blurRad="50900" dist="38500" dir="13500000">
-                    <a:srgbClr val="000000">
-                      <a:alpha val="60000"/>
-                    </a:srgbClr>
-                  </a:innerShdw>
-                </a:effectLst>
-                <a:latin typeface="Showcard Gothic" panose="04020904020102020604" pitchFamily="82" charset="0"/>
-              </a:rPr>
-              <a:t>New game</a:t>
-            </a:r>
-          </a:p>
-        </p:txBody>
-      </p:sp>
-      <p:sp>
-        <p:nvSpPr>
-          <p:cNvPr id="9" name="Retângulo com Canto Diagonal Aparado 8"/>
-          <p:cNvSpPr/>
-          <p:nvPr/>
-        </p:nvSpPr>
-        <p:spPr>
-          <a:xfrm>
-            <a:off x="4932040" y="5805320"/>
-            <a:ext cx="1764000" cy="504000"/>
-          </a:xfrm>
-          <a:prstGeom prst="snip2DiagRect">
-            <a:avLst>
-              <a:gd name="adj1" fmla="val 27925"/>
-              <a:gd name="adj2" fmla="val 33804"/>
-            </a:avLst>
-          </a:prstGeom>
-          <a:blipFill>
-            <a:blip r:embed="rId3">
-              <a:grayscl/>
-            </a:blip>
-            <a:tile tx="0" ty="0" sx="100000" sy="100000" flip="none" algn="tl"/>
-          </a:blipFill>
-          <a:ln>
-            <a:noFill/>
-          </a:ln>
-          <a:scene3d>
-            <a:camera prst="orthographicFront"/>
-            <a:lightRig rig="threePt" dir="t"/>
-          </a:scene3d>
-          <a:sp3d extrusionH="76200">
-            <a:bevelT prst="angle"/>
-            <a:extrusionClr>
-              <a:srgbClr val="FF0000"/>
-            </a:extrusionClr>
-          </a:sp3d>
-        </p:spPr>
-        <p:style>
-          <a:lnRef idx="2">
-            <a:schemeClr val="accent1">
-              <a:shade val="50000"/>
-            </a:schemeClr>
-          </a:lnRef>
-          <a:fillRef idx="1">
-            <a:schemeClr val="accent1"/>
-          </a:fillRef>
-          <a:effectRef idx="0">
-            <a:schemeClr val="accent1"/>
-          </a:effectRef>
-          <a:fontRef idx="minor">
-            <a:schemeClr val="lt1"/>
-          </a:fontRef>
-        </p:style>
-        <p:txBody>
-          <a:bodyPr rtlCol="0" anchor="ctr"/>
-          <a:lstStyle/>
-          <a:p>
-            <a:pPr algn="ctr"/>
-            <a:r>
-              <a:rPr lang="pt-BR" sz="2000" b="1" spc="50" dirty="0">
-                <a:ln w="13500">
-                  <a:solidFill>
-                    <a:schemeClr val="accent1">
-                      <a:shade val="2500"/>
-                      <a:alpha val="6500"/>
-                    </a:schemeClr>
-                  </a:solidFill>
-                  <a:prstDash val="solid"/>
-                </a:ln>
-                <a:solidFill>
-                  <a:schemeClr val="bg1">
-                    <a:lumMod val="50000"/>
-                    <a:alpha val="60000"/>
-                  </a:schemeClr>
-                </a:solidFill>
-                <a:effectLst>
-                  <a:innerShdw blurRad="50900" dist="38500" dir="13500000">
-                    <a:srgbClr val="000000">
-                      <a:alpha val="60000"/>
-                    </a:srgbClr>
-                  </a:innerShdw>
-                </a:effectLst>
-                <a:latin typeface="Showcard Gothic" panose="04020904020102020604" pitchFamily="82" charset="0"/>
-              </a:rPr>
-              <a:t>quit</a:t>
-            </a:r>
-          </a:p>
-        </p:txBody>
-      </p:sp>
-      <p:sp>
-        <p:nvSpPr>
           <p:cNvPr id="10" name="CaixaDeTexto 9"/>
           <p:cNvSpPr txBox="1"/>
           <p:nvPr/>
         </p:nvSpPr>
         <p:spPr>
           <a:xfrm>
-            <a:off x="251520" y="1772814"/>
-            <a:ext cx="5328592" cy="1296033"/>
+            <a:off x="310029" y="1916450"/>
+            <a:ext cx="4536504" cy="791975"/>
           </a:xfrm>
           <a:prstGeom prst="rect">
             <a:avLst/>
@@ -3471,8 +3190,8 @@
         </p:nvSpPr>
         <p:spPr>
           <a:xfrm>
-            <a:off x="323527" y="2996952"/>
-            <a:ext cx="5355378" cy="829277"/>
+            <a:off x="323527" y="2780928"/>
+            <a:ext cx="4608513" cy="1045302"/>
           </a:xfrm>
           <a:prstGeom prst="rect">
             <a:avLst/>
@@ -3525,11 +3244,11 @@
           <p:nvPr/>
         </p:nvPicPr>
         <p:blipFill>
-          <a:blip r:embed="rId6" cstate="print">
+          <a:blip r:embed="rId3" cstate="print">
             <a:extLst>
               <a:ext uri="{BEBA8EAE-BF5A-486C-A8C5-ECC9F3942E4B}">
                 <a14:imgProps xmlns:a14="http://schemas.microsoft.com/office/drawing/2010/main">
-                  <a14:imgLayer r:embed="rId7">
+                  <a14:imgLayer r:embed="rId4">
                     <a14:imgEffect>
                       <a14:backgroundRemoval t="0" b="100000" l="0" r="100000">
                         <a14:foregroundMark x1="28613" y1="43932" x2="33496" y2="48345"/>
@@ -3560,8 +3279,8 @@
         </p:blipFill>
         <p:spPr>
           <a:xfrm>
-            <a:off x="353524" y="3477333"/>
-            <a:ext cx="3426388" cy="3336043"/>
+            <a:off x="310029" y="3813119"/>
+            <a:ext cx="3096344" cy="3014701"/>
           </a:xfrm>
           <a:prstGeom prst="rect">
             <a:avLst/>
@@ -3603,7 +3322,7 @@
           <p:cNvPr id="6" name="Retângulo 5">
             <a:extLst>
               <a:ext uri="{FF2B5EF4-FFF2-40B4-BE49-F238E27FC236}">
-                <a16:creationId xmlns:a16="http://schemas.microsoft.com/office/drawing/2014/main" id="{C4EA23E7-9E36-4E4B-975E-77057A37E63C}"/>
+                <a16:creationId xmlns="" xmlns:a16="http://schemas.microsoft.com/office/drawing/2014/main" id="{C4EA23E7-9E36-4E4B-975E-77057A37E63C}"/>
               </a:ext>
             </a:extLst>
           </p:cNvPr>
@@ -3655,7 +3374,7 @@
           <p:cNvPr id="9" name="Retângulo com Canto Diagonal Aparado 8">
             <a:extLst>
               <a:ext uri="{FF2B5EF4-FFF2-40B4-BE49-F238E27FC236}">
-                <a16:creationId xmlns:a16="http://schemas.microsoft.com/office/drawing/2014/main" id="{232196DB-A7E0-4CC7-B377-0291C9DCA887}"/>
+                <a16:creationId xmlns="" xmlns:a16="http://schemas.microsoft.com/office/drawing/2014/main" id="{232196DB-A7E0-4CC7-B377-0291C9DCA887}"/>
               </a:ext>
             </a:extLst>
           </p:cNvPr>

</xml_diff>